<commit_message>
Coded - Envoriment Movement arranged
</commit_message>
<xml_diff>
--- a/Dökümanlar/Zombi Slayers.pptx
+++ b/Dökümanlar/Zombi Slayers.pptx
@@ -122,6 +122,38 @@
 </p:presentation>
 </file>
 
+<file path=ppt/authors.xml><?xml version="1.0" encoding="utf-8"?>
+<p188:authorLst xmlns:a="http://schemas.openxmlformats.org/drawingml/2006/main" xmlns:r="http://schemas.openxmlformats.org/officeDocument/2006/relationships" xmlns:p188="http://schemas.microsoft.com/office/powerpoint/2018/8/main">
+  <p188:author id="{28A7F205-2C19-EC5A-AFF8-24563CA9BF49}" name="Muhammet Şua CAN" initials="MC" userId="S::225040044@stu.istinye.edu.tr::7d0bce66-0798-4dc8-96f8-79265fd31ee9" providerId="AD"/>
+</p188:authorLst>
+</file>
+
+<file path=ppt/comments/modernComment_101_997ECA8E.xml><?xml version="1.0" encoding="utf-8"?>
+<p188:cmLst xmlns:a="http://schemas.openxmlformats.org/drawingml/2006/main" xmlns:r="http://schemas.openxmlformats.org/officeDocument/2006/relationships" xmlns:p188="http://schemas.microsoft.com/office/powerpoint/2018/8/main">
+  <p188:cm id="{88389CCD-E63A-42A4-B865-27D8B4D3D65E}" authorId="{28A7F205-2C19-EC5A-AFF8-24563CA9BF49}" created="2025-03-11T02:39:45.318">
+    <ac:txMkLst xmlns:ac="http://schemas.microsoft.com/office/drawing/2013/main/command">
+      <pc:docMk xmlns:pc="http://schemas.microsoft.com/office/powerpoint/2013/main/command"/>
+      <pc:sldMk xmlns:pc="http://schemas.microsoft.com/office/powerpoint/2013/main/command" cId="2575223438" sldId="257"/>
+      <ac:spMk id="3" creationId="{176725F0-DAA6-0510-EF73-1B004E3C9FF9}"/>
+      <ac:txMk cp="491" len="39">
+        <ac:context len="592" hash="972954174"/>
+      </ac:txMk>
+    </ac:txMkLst>
+    <p188:pos x="9046029" y="4016375"/>
+    <p188:txBody>
+      <a:bodyPr/>
+      <a:lstStyle/>
+      <a:p>
+        <a:r>
+          <a:rPr lang="tr-TR"/>
+          <a:t>Nalaka olm, yetişir yetişir</a:t>
+        </a:r>
+      </a:p>
+    </p188:txBody>
+  </p188:cm>
+</p188:cmLst>
+</file>
+
 <file path=ppt/ink/ink1.xml><?xml version="1.0" encoding="utf-8"?>
 <inkml:ink xmlns:inkml="http://www.w3.org/2003/InkML">
   <inkml:definitions>
@@ -4210,7 +4242,7 @@
           <a:p>
             <a:fld id="{3427844D-08E9-4EA9-BCE4-0615984133BE}" type="datetimeFigureOut">
               <a:rPr lang="tr-TR" smtClean="0"/>
-              <a:t>10.03.2025</a:t>
+              <a:t>11.03.2025</a:t>
             </a:fld>
             <a:endParaRPr lang="tr-TR"/>
           </a:p>
@@ -4408,7 +4440,7 @@
           <a:p>
             <a:fld id="{3427844D-08E9-4EA9-BCE4-0615984133BE}" type="datetimeFigureOut">
               <a:rPr lang="tr-TR" smtClean="0"/>
-              <a:t>10.03.2025</a:t>
+              <a:t>11.03.2025</a:t>
             </a:fld>
             <a:endParaRPr lang="tr-TR"/>
           </a:p>
@@ -4616,7 +4648,7 @@
           <a:p>
             <a:fld id="{3427844D-08E9-4EA9-BCE4-0615984133BE}" type="datetimeFigureOut">
               <a:rPr lang="tr-TR" smtClean="0"/>
-              <a:t>10.03.2025</a:t>
+              <a:t>11.03.2025</a:t>
             </a:fld>
             <a:endParaRPr lang="tr-TR"/>
           </a:p>
@@ -4814,7 +4846,7 @@
           <a:p>
             <a:fld id="{3427844D-08E9-4EA9-BCE4-0615984133BE}" type="datetimeFigureOut">
               <a:rPr lang="tr-TR" smtClean="0"/>
-              <a:t>10.03.2025</a:t>
+              <a:t>11.03.2025</a:t>
             </a:fld>
             <a:endParaRPr lang="tr-TR"/>
           </a:p>
@@ -5089,7 +5121,7 @@
           <a:p>
             <a:fld id="{3427844D-08E9-4EA9-BCE4-0615984133BE}" type="datetimeFigureOut">
               <a:rPr lang="tr-TR" smtClean="0"/>
-              <a:t>10.03.2025</a:t>
+              <a:t>11.03.2025</a:t>
             </a:fld>
             <a:endParaRPr lang="tr-TR"/>
           </a:p>
@@ -5354,7 +5386,7 @@
           <a:p>
             <a:fld id="{3427844D-08E9-4EA9-BCE4-0615984133BE}" type="datetimeFigureOut">
               <a:rPr lang="tr-TR" smtClean="0"/>
-              <a:t>10.03.2025</a:t>
+              <a:t>11.03.2025</a:t>
             </a:fld>
             <a:endParaRPr lang="tr-TR"/>
           </a:p>
@@ -5766,7 +5798,7 @@
           <a:p>
             <a:fld id="{3427844D-08E9-4EA9-BCE4-0615984133BE}" type="datetimeFigureOut">
               <a:rPr lang="tr-TR" smtClean="0"/>
-              <a:t>10.03.2025</a:t>
+              <a:t>11.03.2025</a:t>
             </a:fld>
             <a:endParaRPr lang="tr-TR"/>
           </a:p>
@@ -5907,7 +5939,7 @@
           <a:p>
             <a:fld id="{3427844D-08E9-4EA9-BCE4-0615984133BE}" type="datetimeFigureOut">
               <a:rPr lang="tr-TR" smtClean="0"/>
-              <a:t>10.03.2025</a:t>
+              <a:t>11.03.2025</a:t>
             </a:fld>
             <a:endParaRPr lang="tr-TR"/>
           </a:p>
@@ -6020,7 +6052,7 @@
           <a:p>
             <a:fld id="{3427844D-08E9-4EA9-BCE4-0615984133BE}" type="datetimeFigureOut">
               <a:rPr lang="tr-TR" smtClean="0"/>
-              <a:t>10.03.2025</a:t>
+              <a:t>11.03.2025</a:t>
             </a:fld>
             <a:endParaRPr lang="tr-TR"/>
           </a:p>
@@ -6331,7 +6363,7 @@
           <a:p>
             <a:fld id="{3427844D-08E9-4EA9-BCE4-0615984133BE}" type="datetimeFigureOut">
               <a:rPr lang="tr-TR" smtClean="0"/>
-              <a:t>10.03.2025</a:t>
+              <a:t>11.03.2025</a:t>
             </a:fld>
             <a:endParaRPr lang="tr-TR"/>
           </a:p>
@@ -6619,7 +6651,7 @@
           <a:p>
             <a:fld id="{3427844D-08E9-4EA9-BCE4-0615984133BE}" type="datetimeFigureOut">
               <a:rPr lang="tr-TR" smtClean="0"/>
-              <a:t>10.03.2025</a:t>
+              <a:t>11.03.2025</a:t>
             </a:fld>
             <a:endParaRPr lang="tr-TR"/>
           </a:p>
@@ -6860,7 +6892,7 @@
           <a:p>
             <a:fld id="{3427844D-08E9-4EA9-BCE4-0615984133BE}" type="datetimeFigureOut">
               <a:rPr lang="tr-TR" smtClean="0"/>
-              <a:t>10.03.2025</a:t>
+              <a:t>11.03.2025</a:t>
             </a:fld>
             <a:endParaRPr lang="tr-TR"/>
           </a:p>
@@ -7964,6 +7996,11 @@
   <p:clrMapOvr>
     <a:masterClrMapping/>
   </p:clrMapOvr>
+  <p:extLst>
+    <p:ext uri="{6950BFC3-D8DA-4A85-94F7-54DA5524770B}">
+      <p188:commentRel xmlns:p188="http://schemas.microsoft.com/office/powerpoint/2018/8/main" r:id="rId2"/>
+    </p:ext>
+  </p:extLst>
 </p:sld>
 </file>
 
@@ -8399,9 +8436,6 @@
             </a:r>
           </a:p>
           <a:p>
-            <a:pPr marL="0" indent="0">
-              <a:buNone/>
-            </a:pPr>
             <a:r>
               <a:rPr lang="tr-TR" dirty="0"/>
               <a:t>Oyunda her </a:t>
@@ -8449,9 +8483,6 @@
             </a:r>
           </a:p>
           <a:p>
-            <a:pPr marL="0" indent="0">
-              <a:buNone/>
-            </a:pPr>
             <a:r>
               <a:rPr lang="tr-TR" dirty="0"/>
               <a:t>Bir bölümde 3 </a:t>

</xml_diff>